<commit_message>
almost finished second alg.!!
</commit_message>
<xml_diff>
--- a/unroteed_tree_created_by_figure_5.pptx
+++ b/unroteed_tree_created_by_figure_5.pptx
@@ -16,6 +16,8 @@
     <p:sldId id="265" r:id="rId10"/>
     <p:sldId id="266" r:id="rId11"/>
     <p:sldId id="267" r:id="rId12"/>
+    <p:sldId id="268" r:id="rId13"/>
+    <p:sldId id="269" r:id="rId14"/>
   </p:sldIdLst>
   <p:sldSz cx="12192000" cy="6858000"/>
   <p:notesSz cx="7102475" cy="10233025"/>
@@ -5482,8 +5484,8 @@
           </a:p>
         </p:txBody>
       </p:sp>
-      <mc:AlternateContent xmlns:mc="http://schemas.openxmlformats.org/markup-compatibility/2006">
-        <mc:Choice xmlns:a14="http://schemas.microsoft.com/office/drawing/2010/main" Requires="a14">
+      <mc:AlternateContent xmlns:mc="http://schemas.openxmlformats.org/markup-compatibility/2006" xmlns:a14="http://schemas.microsoft.com/office/drawing/2010/main">
+        <mc:Choice Requires="a14">
           <p:sp>
             <p:nvSpPr>
               <p:cNvPr id="34" name="CasellaDiTesto 33">
@@ -5533,7 +5535,7 @@
             </p:txBody>
           </p:sp>
         </mc:Choice>
-        <mc:Fallback>
+        <mc:Fallback xmlns="">
           <p:sp>
             <p:nvSpPr>
               <p:cNvPr id="34" name="CasellaDiTesto 33">
@@ -5578,8 +5580,8 @@
           </p:sp>
         </mc:Fallback>
       </mc:AlternateContent>
-      <mc:AlternateContent xmlns:mc="http://schemas.openxmlformats.org/markup-compatibility/2006">
-        <mc:Choice xmlns:a14="http://schemas.microsoft.com/office/drawing/2010/main" Requires="a14">
+      <mc:AlternateContent xmlns:mc="http://schemas.openxmlformats.org/markup-compatibility/2006" xmlns:a14="http://schemas.microsoft.com/office/drawing/2010/main">
+        <mc:Choice Requires="a14">
           <p:sp>
             <p:nvSpPr>
               <p:cNvPr id="24" name="CasellaDiTesto 23">
@@ -5685,7 +5687,7 @@
             </p:txBody>
           </p:sp>
         </mc:Choice>
-        <mc:Fallback>
+        <mc:Fallback xmlns="">
           <p:sp>
             <p:nvSpPr>
               <p:cNvPr id="24" name="CasellaDiTesto 23">
@@ -5734,6 +5736,1784 @@
     <p:extLst>
       <p:ext uri="{BB962C8B-B14F-4D97-AF65-F5344CB8AC3E}">
         <p14:creationId xmlns:p14="http://schemas.microsoft.com/office/powerpoint/2010/main" val="125983716"/>
+      </p:ext>
+    </p:extLst>
+  </p:cSld>
+  <p:clrMapOvr>
+    <a:masterClrMapping/>
+  </p:clrMapOvr>
+</p:sld>
+</file>
+
+<file path=ppt/slides/slide12.xml><?xml version="1.0" encoding="utf-8"?>
+<p:sld xmlns:a="http://schemas.openxmlformats.org/drawingml/2006/main" xmlns:r="http://schemas.openxmlformats.org/officeDocument/2006/relationships" xmlns:p="http://schemas.openxmlformats.org/presentationml/2006/main">
+  <p:cSld>
+    <p:spTree>
+      <p:nvGrpSpPr>
+        <p:cNvPr id="1" name=""/>
+        <p:cNvGrpSpPr/>
+        <p:nvPr/>
+      </p:nvGrpSpPr>
+      <p:grpSpPr>
+        <a:xfrm>
+          <a:off x="0" y="0"/>
+          <a:ext cx="0" cy="0"/>
+          <a:chOff x="0" y="0"/>
+          <a:chExt cx="0" cy="0"/>
+        </a:xfrm>
+      </p:grpSpPr>
+      <p:cxnSp>
+        <p:nvCxnSpPr>
+          <p:cNvPr id="16" name="Connettore diritto 15">
+            <a:extLst>
+              <a:ext uri="{FF2B5EF4-FFF2-40B4-BE49-F238E27FC236}">
+                <a16:creationId xmlns:a16="http://schemas.microsoft.com/office/drawing/2014/main" id="{8268FD8E-4824-404F-A1F5-D6DA2BBBD26C}"/>
+              </a:ext>
+            </a:extLst>
+          </p:cNvPr>
+          <p:cNvCxnSpPr>
+            <a:cxnSpLocks/>
+          </p:cNvCxnSpPr>
+          <p:nvPr/>
+        </p:nvCxnSpPr>
+        <p:spPr>
+          <a:xfrm flipV="1">
+            <a:off x="4247307" y="3308434"/>
+            <a:ext cx="2069629" cy="14558"/>
+          </a:xfrm>
+          <a:prstGeom prst="line">
+            <a:avLst/>
+          </a:prstGeom>
+          <a:ln>
+            <a:headEnd type="none" w="med" len="med"/>
+            <a:tailEnd type="none" w="med" len="med"/>
+          </a:ln>
+        </p:spPr>
+        <p:style>
+          <a:lnRef idx="3">
+            <a:schemeClr val="dk1"/>
+          </a:lnRef>
+          <a:fillRef idx="0">
+            <a:schemeClr val="dk1"/>
+          </a:fillRef>
+          <a:effectRef idx="2">
+            <a:schemeClr val="dk1"/>
+          </a:effectRef>
+          <a:fontRef idx="minor">
+            <a:schemeClr val="tx1"/>
+          </a:fontRef>
+        </p:style>
+      </p:cxnSp>
+      <p:cxnSp>
+        <p:nvCxnSpPr>
+          <p:cNvPr id="25" name="Connettore diritto 24">
+            <a:extLst>
+              <a:ext uri="{FF2B5EF4-FFF2-40B4-BE49-F238E27FC236}">
+                <a16:creationId xmlns:a16="http://schemas.microsoft.com/office/drawing/2014/main" id="{77F49E93-79D8-476D-B5F7-01377E381AA1}"/>
+              </a:ext>
+            </a:extLst>
+          </p:cNvPr>
+          <p:cNvCxnSpPr>
+            <a:cxnSpLocks/>
+          </p:cNvCxnSpPr>
+          <p:nvPr/>
+        </p:nvCxnSpPr>
+        <p:spPr>
+          <a:xfrm>
+            <a:off x="6272162" y="3295405"/>
+            <a:ext cx="1700170" cy="1381886"/>
+          </a:xfrm>
+          <a:prstGeom prst="line">
+            <a:avLst/>
+          </a:prstGeom>
+          <a:ln/>
+        </p:spPr>
+        <p:style>
+          <a:lnRef idx="3">
+            <a:schemeClr val="dk1"/>
+          </a:lnRef>
+          <a:fillRef idx="0">
+            <a:schemeClr val="dk1"/>
+          </a:fillRef>
+          <a:effectRef idx="2">
+            <a:schemeClr val="dk1"/>
+          </a:effectRef>
+          <a:fontRef idx="minor">
+            <a:schemeClr val="tx1"/>
+          </a:fontRef>
+        </p:style>
+      </p:cxnSp>
+      <p:cxnSp>
+        <p:nvCxnSpPr>
+          <p:cNvPr id="23" name="Connettore diritto 22">
+            <a:extLst>
+              <a:ext uri="{FF2B5EF4-FFF2-40B4-BE49-F238E27FC236}">
+                <a16:creationId xmlns:a16="http://schemas.microsoft.com/office/drawing/2014/main" id="{FDA6CBB9-9AF0-4020-9652-FBEA53DB49A8}"/>
+              </a:ext>
+            </a:extLst>
+          </p:cNvPr>
+          <p:cNvCxnSpPr>
+            <a:cxnSpLocks/>
+          </p:cNvCxnSpPr>
+          <p:nvPr/>
+        </p:nvCxnSpPr>
+        <p:spPr>
+          <a:xfrm flipH="1">
+            <a:off x="6269201" y="1913520"/>
+            <a:ext cx="1703134" cy="1381885"/>
+          </a:xfrm>
+          <a:prstGeom prst="line">
+            <a:avLst/>
+          </a:prstGeom>
+          <a:ln/>
+        </p:spPr>
+        <p:style>
+          <a:lnRef idx="3">
+            <a:schemeClr val="dk1"/>
+          </a:lnRef>
+          <a:fillRef idx="0">
+            <a:schemeClr val="dk1"/>
+          </a:fillRef>
+          <a:effectRef idx="2">
+            <a:schemeClr val="dk1"/>
+          </a:effectRef>
+          <a:fontRef idx="minor">
+            <a:schemeClr val="tx1"/>
+          </a:fontRef>
+        </p:style>
+      </p:cxnSp>
+      <p:sp>
+        <p:nvSpPr>
+          <p:cNvPr id="9" name="Ovale 8">
+            <a:extLst>
+              <a:ext uri="{FF2B5EF4-FFF2-40B4-BE49-F238E27FC236}">
+                <a16:creationId xmlns:a16="http://schemas.microsoft.com/office/drawing/2014/main" id="{E1CD858E-A9AC-498F-B0ED-9337B0DBAC7D}"/>
+              </a:ext>
+            </a:extLst>
+          </p:cNvPr>
+          <p:cNvSpPr/>
+          <p:nvPr/>
+        </p:nvSpPr>
+        <p:spPr>
+          <a:xfrm>
+            <a:off x="5999523" y="3039541"/>
+            <a:ext cx="545285" cy="511729"/>
+          </a:xfrm>
+          <a:prstGeom prst="ellipse">
+            <a:avLst/>
+          </a:prstGeom>
+          <a:solidFill>
+            <a:schemeClr val="bg2">
+              <a:lumMod val="50000"/>
+            </a:schemeClr>
+          </a:solidFill>
+          <a:ln>
+            <a:solidFill>
+              <a:schemeClr val="tx1">
+                <a:lumMod val="85000"/>
+                <a:lumOff val="15000"/>
+              </a:schemeClr>
+            </a:solidFill>
+          </a:ln>
+        </p:spPr>
+        <p:style>
+          <a:lnRef idx="2">
+            <a:schemeClr val="accent1">
+              <a:shade val="50000"/>
+            </a:schemeClr>
+          </a:lnRef>
+          <a:fillRef idx="1">
+            <a:schemeClr val="accent1"/>
+          </a:fillRef>
+          <a:effectRef idx="0">
+            <a:schemeClr val="accent1"/>
+          </a:effectRef>
+          <a:fontRef idx="minor">
+            <a:schemeClr val="lt1"/>
+          </a:fontRef>
+        </p:style>
+        <p:txBody>
+          <a:bodyPr rtlCol="0" anchor="ctr"/>
+          <a:lstStyle/>
+          <a:p>
+            <a:pPr algn="ctr"/>
+            <a:r>
+              <a:rPr lang="it-IT" sz="2400" i="1" dirty="0"/>
+              <a:t>k</a:t>
+            </a:r>
+          </a:p>
+        </p:txBody>
+      </p:sp>
+      <p:sp>
+        <p:nvSpPr>
+          <p:cNvPr id="10" name="Ovale 9">
+            <a:extLst>
+              <a:ext uri="{FF2B5EF4-FFF2-40B4-BE49-F238E27FC236}">
+                <a16:creationId xmlns:a16="http://schemas.microsoft.com/office/drawing/2014/main" id="{87F835B7-821B-4C37-9ABF-E05F9D123497}"/>
+              </a:ext>
+            </a:extLst>
+          </p:cNvPr>
+          <p:cNvSpPr/>
+          <p:nvPr/>
+        </p:nvSpPr>
+        <p:spPr>
+          <a:xfrm>
+            <a:off x="7699693" y="4382417"/>
+            <a:ext cx="545285" cy="511729"/>
+          </a:xfrm>
+          <a:prstGeom prst="ellipse">
+            <a:avLst/>
+          </a:prstGeom>
+          <a:solidFill>
+            <a:schemeClr val="bg2">
+              <a:lumMod val="50000"/>
+            </a:schemeClr>
+          </a:solidFill>
+          <a:ln>
+            <a:solidFill>
+              <a:schemeClr val="tx1">
+                <a:lumMod val="85000"/>
+                <a:lumOff val="15000"/>
+              </a:schemeClr>
+            </a:solidFill>
+          </a:ln>
+        </p:spPr>
+        <p:style>
+          <a:lnRef idx="2">
+            <a:schemeClr val="accent1">
+              <a:shade val="50000"/>
+            </a:schemeClr>
+          </a:lnRef>
+          <a:fillRef idx="1">
+            <a:schemeClr val="accent1"/>
+          </a:fillRef>
+          <a:effectRef idx="0">
+            <a:schemeClr val="accent1"/>
+          </a:effectRef>
+          <a:fontRef idx="minor">
+            <a:schemeClr val="lt1"/>
+          </a:fontRef>
+        </p:style>
+        <p:txBody>
+          <a:bodyPr rtlCol="0" anchor="ctr"/>
+          <a:lstStyle/>
+          <a:p>
+            <a:pPr algn="ctr"/>
+            <a:r>
+              <a:rPr lang="it-IT" sz="2400" dirty="0"/>
+              <a:t>s</a:t>
+            </a:r>
+          </a:p>
+        </p:txBody>
+      </p:sp>
+      <p:sp>
+        <p:nvSpPr>
+          <p:cNvPr id="11" name="Ovale 10">
+            <a:extLst>
+              <a:ext uri="{FF2B5EF4-FFF2-40B4-BE49-F238E27FC236}">
+                <a16:creationId xmlns:a16="http://schemas.microsoft.com/office/drawing/2014/main" id="{D5EFBF8E-3097-4D14-871D-D0818153B3B1}"/>
+              </a:ext>
+            </a:extLst>
+          </p:cNvPr>
+          <p:cNvSpPr/>
+          <p:nvPr/>
+        </p:nvSpPr>
+        <p:spPr>
+          <a:xfrm>
+            <a:off x="7699693" y="1657656"/>
+            <a:ext cx="545285" cy="511729"/>
+          </a:xfrm>
+          <a:prstGeom prst="ellipse">
+            <a:avLst/>
+          </a:prstGeom>
+          <a:solidFill>
+            <a:schemeClr val="bg2">
+              <a:lumMod val="50000"/>
+            </a:schemeClr>
+          </a:solidFill>
+          <a:ln>
+            <a:solidFill>
+              <a:schemeClr val="tx1">
+                <a:lumMod val="85000"/>
+                <a:lumOff val="15000"/>
+              </a:schemeClr>
+            </a:solidFill>
+          </a:ln>
+        </p:spPr>
+        <p:style>
+          <a:lnRef idx="2">
+            <a:schemeClr val="accent1">
+              <a:shade val="50000"/>
+            </a:schemeClr>
+          </a:lnRef>
+          <a:fillRef idx="1">
+            <a:schemeClr val="accent1"/>
+          </a:fillRef>
+          <a:effectRef idx="0">
+            <a:schemeClr val="accent1"/>
+          </a:effectRef>
+          <a:fontRef idx="minor">
+            <a:schemeClr val="lt1"/>
+          </a:fontRef>
+        </p:style>
+        <p:txBody>
+          <a:bodyPr rtlCol="0" anchor="ctr"/>
+          <a:lstStyle/>
+          <a:p>
+            <a:pPr algn="ctr"/>
+            <a:r>
+              <a:rPr lang="it-IT" sz="2400" dirty="0"/>
+              <a:t>u</a:t>
+            </a:r>
+          </a:p>
+        </p:txBody>
+      </p:sp>
+      <mc:AlternateContent xmlns:mc="http://schemas.openxmlformats.org/markup-compatibility/2006">
+        <mc:Choice xmlns:a14="http://schemas.microsoft.com/office/drawing/2010/main" Requires="a14">
+          <p:sp>
+            <p:nvSpPr>
+              <p:cNvPr id="34" name="CasellaDiTesto 33">
+                <a:extLst>
+                  <a:ext uri="{FF2B5EF4-FFF2-40B4-BE49-F238E27FC236}">
+                    <a16:creationId xmlns:a16="http://schemas.microsoft.com/office/drawing/2014/main" id="{3043EDF5-0856-4F39-8192-5232679663C3}"/>
+                  </a:ext>
+                </a:extLst>
+              </p:cNvPr>
+              <p:cNvSpPr txBox="1"/>
+              <p:nvPr/>
+            </p:nvSpPr>
+            <p:spPr>
+              <a:xfrm rot="19256206">
+                <a:off x="6585331" y="2182765"/>
+                <a:ext cx="1008724" cy="369332"/>
+              </a:xfrm>
+              <a:prstGeom prst="rect">
+                <a:avLst/>
+              </a:prstGeom>
+              <a:noFill/>
+            </p:spPr>
+            <p:txBody>
+              <a:bodyPr wrap="square" rtlCol="0">
+                <a:spAutoFit/>
+              </a:bodyPr>
+              <a:lstStyle/>
+              <a:p>
+                <a:pPr/>
+                <a14:m>
+                  <m:oMathPara xmlns:m="http://schemas.openxmlformats.org/officeDocument/2006/math">
+                    <m:oMathParaPr>
+                      <m:jc m:val="centerGroup"/>
+                    </m:oMathParaPr>
+                    <m:oMath xmlns:m="http://schemas.openxmlformats.org/officeDocument/2006/math">
+                      <m:r>
+                        <a:rPr lang="it-IT" i="1" smtClean="0">
+                          <a:latin typeface="Cambria Math" panose="02040503050406030204" pitchFamily="18" charset="0"/>
+                        </a:rPr>
+                        <m:t>6</m:t>
+                      </m:r>
+                    </m:oMath>
+                  </m:oMathPara>
+                </a14:m>
+                <a:endParaRPr lang="it-IT" dirty="0"/>
+              </a:p>
+            </p:txBody>
+          </p:sp>
+        </mc:Choice>
+        <mc:Fallback>
+          <p:sp>
+            <p:nvSpPr>
+              <p:cNvPr id="34" name="CasellaDiTesto 33">
+                <a:extLst>
+                  <a:ext uri="{FF2B5EF4-FFF2-40B4-BE49-F238E27FC236}">
+                    <a16:creationId xmlns:a16="http://schemas.microsoft.com/office/drawing/2014/main" id="{3043EDF5-0856-4F39-8192-5232679663C3}"/>
+                  </a:ext>
+                </a:extLst>
+              </p:cNvPr>
+              <p:cNvSpPr txBox="1">
+                <a:spLocks noRot="1" noChangeAspect="1" noMove="1" noResize="1" noEditPoints="1" noAdjustHandles="1" noChangeArrowheads="1" noChangeShapeType="1" noTextEdit="1"/>
+              </p:cNvSpPr>
+              <p:nvPr/>
+            </p:nvSpPr>
+            <p:spPr>
+              <a:xfrm rot="19256206">
+                <a:off x="6585331" y="2182765"/>
+                <a:ext cx="1008724" cy="369332"/>
+              </a:xfrm>
+              <a:prstGeom prst="rect">
+                <a:avLst/>
+              </a:prstGeom>
+              <a:blipFill>
+                <a:blip r:embed="rId2"/>
+                <a:stretch>
+                  <a:fillRect/>
+                </a:stretch>
+              </a:blipFill>
+            </p:spPr>
+            <p:txBody>
+              <a:bodyPr/>
+              <a:lstStyle/>
+              <a:p>
+                <a:r>
+                  <a:rPr lang="it-IT">
+                    <a:noFill/>
+                  </a:rPr>
+                  <a:t> </a:t>
+                </a:r>
+              </a:p>
+            </p:txBody>
+          </p:sp>
+        </mc:Fallback>
+      </mc:AlternateContent>
+      <mc:AlternateContent xmlns:mc="http://schemas.openxmlformats.org/markup-compatibility/2006">
+        <mc:Choice xmlns:a14="http://schemas.microsoft.com/office/drawing/2010/main" Requires="a14">
+          <p:sp>
+            <p:nvSpPr>
+              <p:cNvPr id="20" name="CasellaDiTesto 19">
+                <a:extLst>
+                  <a:ext uri="{FF2B5EF4-FFF2-40B4-BE49-F238E27FC236}">
+                    <a16:creationId xmlns:a16="http://schemas.microsoft.com/office/drawing/2014/main" id="{AEC37D64-B461-4739-B615-49B84BD77AC6}"/>
+                  </a:ext>
+                </a:extLst>
+              </p:cNvPr>
+              <p:cNvSpPr txBox="1"/>
+              <p:nvPr/>
+            </p:nvSpPr>
+            <p:spPr>
+              <a:xfrm rot="2308727">
+                <a:off x="6457698" y="3904878"/>
+                <a:ext cx="1008724" cy="369332"/>
+              </a:xfrm>
+              <a:prstGeom prst="rect">
+                <a:avLst/>
+              </a:prstGeom>
+              <a:noFill/>
+            </p:spPr>
+            <p:txBody>
+              <a:bodyPr wrap="square" rtlCol="0">
+                <a:spAutoFit/>
+              </a:bodyPr>
+              <a:lstStyle/>
+              <a:p>
+                <a:pPr/>
+                <a14:m>
+                  <m:oMathPara xmlns:m="http://schemas.openxmlformats.org/officeDocument/2006/math">
+                    <m:oMathParaPr>
+                      <m:jc m:val="centerGroup"/>
+                    </m:oMathParaPr>
+                    <m:oMath xmlns:m="http://schemas.openxmlformats.org/officeDocument/2006/math">
+                      <m:r>
+                        <a:rPr lang="it-IT" i="1" smtClean="0">
+                          <a:latin typeface="Cambria Math" panose="02040503050406030204" pitchFamily="18" charset="0"/>
+                        </a:rPr>
+                        <m:t>7</m:t>
+                      </m:r>
+                    </m:oMath>
+                  </m:oMathPara>
+                </a14:m>
+                <a:endParaRPr lang="it-IT" dirty="0"/>
+              </a:p>
+            </p:txBody>
+          </p:sp>
+        </mc:Choice>
+        <mc:Fallback>
+          <p:sp>
+            <p:nvSpPr>
+              <p:cNvPr id="20" name="CasellaDiTesto 19">
+                <a:extLst>
+                  <a:ext uri="{FF2B5EF4-FFF2-40B4-BE49-F238E27FC236}">
+                    <a16:creationId xmlns:a16="http://schemas.microsoft.com/office/drawing/2014/main" id="{AEC37D64-B461-4739-B615-49B84BD77AC6}"/>
+                  </a:ext>
+                </a:extLst>
+              </p:cNvPr>
+              <p:cNvSpPr txBox="1">
+                <a:spLocks noRot="1" noChangeAspect="1" noMove="1" noResize="1" noEditPoints="1" noAdjustHandles="1" noChangeArrowheads="1" noChangeShapeType="1" noTextEdit="1"/>
+              </p:cNvSpPr>
+              <p:nvPr/>
+            </p:nvSpPr>
+            <p:spPr>
+              <a:xfrm rot="2308727">
+                <a:off x="6457698" y="3904878"/>
+                <a:ext cx="1008724" cy="369332"/>
+              </a:xfrm>
+              <a:prstGeom prst="rect">
+                <a:avLst/>
+              </a:prstGeom>
+              <a:blipFill>
+                <a:blip r:embed="rId3"/>
+                <a:stretch>
+                  <a:fillRect/>
+                </a:stretch>
+              </a:blipFill>
+            </p:spPr>
+            <p:txBody>
+              <a:bodyPr/>
+              <a:lstStyle/>
+              <a:p>
+                <a:r>
+                  <a:rPr lang="it-IT">
+                    <a:noFill/>
+                  </a:rPr>
+                  <a:t> </a:t>
+                </a:r>
+              </a:p>
+            </p:txBody>
+          </p:sp>
+        </mc:Fallback>
+      </mc:AlternateContent>
+      <p:sp>
+        <p:nvSpPr>
+          <p:cNvPr id="15" name="Ovale 14">
+            <a:extLst>
+              <a:ext uri="{FF2B5EF4-FFF2-40B4-BE49-F238E27FC236}">
+                <a16:creationId xmlns:a16="http://schemas.microsoft.com/office/drawing/2014/main" id="{8D5BD6A8-4A8D-4BFF-8C89-28AAD2DD2E07}"/>
+              </a:ext>
+            </a:extLst>
+          </p:cNvPr>
+          <p:cNvSpPr/>
+          <p:nvPr/>
+        </p:nvSpPr>
+        <p:spPr>
+          <a:xfrm>
+            <a:off x="3891990" y="3039541"/>
+            <a:ext cx="545285" cy="511729"/>
+          </a:xfrm>
+          <a:prstGeom prst="ellipse">
+            <a:avLst/>
+          </a:prstGeom>
+          <a:solidFill>
+            <a:schemeClr val="bg2">
+              <a:lumMod val="50000"/>
+            </a:schemeClr>
+          </a:solidFill>
+          <a:ln>
+            <a:solidFill>
+              <a:schemeClr val="tx1">
+                <a:lumMod val="85000"/>
+                <a:lumOff val="15000"/>
+              </a:schemeClr>
+            </a:solidFill>
+          </a:ln>
+        </p:spPr>
+        <p:style>
+          <a:lnRef idx="2">
+            <a:schemeClr val="accent1">
+              <a:shade val="50000"/>
+            </a:schemeClr>
+          </a:lnRef>
+          <a:fillRef idx="1">
+            <a:schemeClr val="accent1"/>
+          </a:fillRef>
+          <a:effectRef idx="0">
+            <a:schemeClr val="accent1"/>
+          </a:effectRef>
+          <a:fontRef idx="minor">
+            <a:schemeClr val="lt1"/>
+          </a:fontRef>
+        </p:style>
+        <p:txBody>
+          <a:bodyPr rtlCol="0" anchor="ctr"/>
+          <a:lstStyle/>
+          <a:p>
+            <a:pPr algn="ctr"/>
+            <a:r>
+              <a:rPr lang="it-IT" sz="2400" dirty="0"/>
+              <a:t>f</a:t>
+            </a:r>
+          </a:p>
+        </p:txBody>
+      </p:sp>
+      <mc:AlternateContent xmlns:mc="http://schemas.openxmlformats.org/markup-compatibility/2006">
+        <mc:Choice xmlns:a14="http://schemas.microsoft.com/office/drawing/2010/main" Requires="a14">
+          <p:sp>
+            <p:nvSpPr>
+              <p:cNvPr id="19" name="CasellaDiTesto 18">
+                <a:extLst>
+                  <a:ext uri="{FF2B5EF4-FFF2-40B4-BE49-F238E27FC236}">
+                    <a16:creationId xmlns:a16="http://schemas.microsoft.com/office/drawing/2014/main" id="{8EBC1935-0AEC-4487-AF17-F984F8DAA849}"/>
+                  </a:ext>
+                </a:extLst>
+              </p:cNvPr>
+              <p:cNvSpPr txBox="1"/>
+              <p:nvPr/>
+            </p:nvSpPr>
+            <p:spPr>
+              <a:xfrm>
+                <a:off x="4706953" y="2923538"/>
+                <a:ext cx="1008724" cy="369332"/>
+              </a:xfrm>
+              <a:prstGeom prst="rect">
+                <a:avLst/>
+              </a:prstGeom>
+              <a:noFill/>
+            </p:spPr>
+            <p:txBody>
+              <a:bodyPr wrap="square" rtlCol="0">
+                <a:spAutoFit/>
+              </a:bodyPr>
+              <a:lstStyle/>
+              <a:p>
+                <a:pPr/>
+                <a14:m>
+                  <m:oMathPara xmlns:m="http://schemas.openxmlformats.org/officeDocument/2006/math">
+                    <m:oMathParaPr>
+                      <m:jc m:val="centerGroup"/>
+                    </m:oMathParaPr>
+                    <m:oMath xmlns:m="http://schemas.openxmlformats.org/officeDocument/2006/math">
+                      <m:r>
+                        <a:rPr lang="it-IT" b="0" i="1" smtClean="0">
+                          <a:latin typeface="Cambria Math" panose="02040503050406030204" pitchFamily="18" charset="0"/>
+                        </a:rPr>
+                        <m:t>15</m:t>
+                      </m:r>
+                    </m:oMath>
+                  </m:oMathPara>
+                </a14:m>
+                <a:endParaRPr lang="it-IT" dirty="0"/>
+              </a:p>
+            </p:txBody>
+          </p:sp>
+        </mc:Choice>
+        <mc:Fallback>
+          <p:sp>
+            <p:nvSpPr>
+              <p:cNvPr id="19" name="CasellaDiTesto 18">
+                <a:extLst>
+                  <a:ext uri="{FF2B5EF4-FFF2-40B4-BE49-F238E27FC236}">
+                    <a16:creationId xmlns:a16="http://schemas.microsoft.com/office/drawing/2014/main" id="{8EBC1935-0AEC-4487-AF17-F984F8DAA849}"/>
+                  </a:ext>
+                </a:extLst>
+              </p:cNvPr>
+              <p:cNvSpPr txBox="1">
+                <a:spLocks noRot="1" noChangeAspect="1" noMove="1" noResize="1" noEditPoints="1" noAdjustHandles="1" noChangeArrowheads="1" noChangeShapeType="1" noTextEdit="1"/>
+              </p:cNvSpPr>
+              <p:nvPr/>
+            </p:nvSpPr>
+            <p:spPr>
+              <a:xfrm>
+                <a:off x="4706953" y="2923538"/>
+                <a:ext cx="1008724" cy="369332"/>
+              </a:xfrm>
+              <a:prstGeom prst="rect">
+                <a:avLst/>
+              </a:prstGeom>
+              <a:blipFill>
+                <a:blip r:embed="rId4"/>
+                <a:stretch>
+                  <a:fillRect/>
+                </a:stretch>
+              </a:blipFill>
+            </p:spPr>
+            <p:txBody>
+              <a:bodyPr/>
+              <a:lstStyle/>
+              <a:p>
+                <a:r>
+                  <a:rPr lang="it-IT">
+                    <a:noFill/>
+                  </a:rPr>
+                  <a:t> </a:t>
+                </a:r>
+              </a:p>
+            </p:txBody>
+          </p:sp>
+        </mc:Fallback>
+      </mc:AlternateContent>
+    </p:spTree>
+    <p:extLst>
+      <p:ext uri="{BB962C8B-B14F-4D97-AF65-F5344CB8AC3E}">
+        <p14:creationId xmlns:p14="http://schemas.microsoft.com/office/powerpoint/2010/main" val="1174757561"/>
+      </p:ext>
+    </p:extLst>
+  </p:cSld>
+  <p:clrMapOvr>
+    <a:masterClrMapping/>
+  </p:clrMapOvr>
+</p:sld>
+</file>
+
+<file path=ppt/slides/slide13.xml><?xml version="1.0" encoding="utf-8"?>
+<p:sld xmlns:a="http://schemas.openxmlformats.org/drawingml/2006/main" xmlns:r="http://schemas.openxmlformats.org/officeDocument/2006/relationships" xmlns:p="http://schemas.openxmlformats.org/presentationml/2006/main">
+  <p:cSld>
+    <p:spTree>
+      <p:nvGrpSpPr>
+        <p:cNvPr id="1" name=""/>
+        <p:cNvGrpSpPr/>
+        <p:nvPr/>
+      </p:nvGrpSpPr>
+      <p:grpSpPr>
+        <a:xfrm>
+          <a:off x="0" y="0"/>
+          <a:ext cx="0" cy="0"/>
+          <a:chOff x="0" y="0"/>
+          <a:chExt cx="0" cy="0"/>
+        </a:xfrm>
+      </p:grpSpPr>
+      <p:cxnSp>
+        <p:nvCxnSpPr>
+          <p:cNvPr id="16" name="Connettore diritto 15">
+            <a:extLst>
+              <a:ext uri="{FF2B5EF4-FFF2-40B4-BE49-F238E27FC236}">
+                <a16:creationId xmlns:a16="http://schemas.microsoft.com/office/drawing/2014/main" id="{8268FD8E-4824-404F-A1F5-D6DA2BBBD26C}"/>
+              </a:ext>
+            </a:extLst>
+          </p:cNvPr>
+          <p:cNvCxnSpPr>
+            <a:cxnSpLocks/>
+          </p:cNvCxnSpPr>
+          <p:nvPr/>
+        </p:nvCxnSpPr>
+        <p:spPr>
+          <a:xfrm flipV="1">
+            <a:off x="5044261" y="3333601"/>
+            <a:ext cx="2069629" cy="14558"/>
+          </a:xfrm>
+          <a:prstGeom prst="line">
+            <a:avLst/>
+          </a:prstGeom>
+          <a:ln>
+            <a:headEnd type="none" w="med" len="med"/>
+            <a:tailEnd type="none" w="med" len="med"/>
+          </a:ln>
+        </p:spPr>
+        <p:style>
+          <a:lnRef idx="3">
+            <a:schemeClr val="dk1"/>
+          </a:lnRef>
+          <a:fillRef idx="0">
+            <a:schemeClr val="dk1"/>
+          </a:fillRef>
+          <a:effectRef idx="2">
+            <a:schemeClr val="dk1"/>
+          </a:effectRef>
+          <a:fontRef idx="minor">
+            <a:schemeClr val="tx1"/>
+          </a:fontRef>
+        </p:style>
+      </p:cxnSp>
+      <p:cxnSp>
+        <p:nvCxnSpPr>
+          <p:cNvPr id="28" name="Connettore diritto 27">
+            <a:extLst>
+              <a:ext uri="{FF2B5EF4-FFF2-40B4-BE49-F238E27FC236}">
+                <a16:creationId xmlns:a16="http://schemas.microsoft.com/office/drawing/2014/main" id="{A1376592-4F22-421E-90D4-70499545155C}"/>
+              </a:ext>
+            </a:extLst>
+          </p:cNvPr>
+          <p:cNvCxnSpPr>
+            <a:cxnSpLocks/>
+          </p:cNvCxnSpPr>
+          <p:nvPr/>
+        </p:nvCxnSpPr>
+        <p:spPr>
+          <a:xfrm>
+            <a:off x="3379048" y="1966273"/>
+            <a:ext cx="1697205" cy="1351764"/>
+          </a:xfrm>
+          <a:prstGeom prst="line">
+            <a:avLst/>
+          </a:prstGeom>
+          <a:ln>
+            <a:headEnd type="none" w="med" len="med"/>
+            <a:tailEnd type="none" w="med" len="med"/>
+          </a:ln>
+        </p:spPr>
+        <p:style>
+          <a:lnRef idx="3">
+            <a:schemeClr val="dk1"/>
+          </a:lnRef>
+          <a:fillRef idx="0">
+            <a:schemeClr val="dk1"/>
+          </a:fillRef>
+          <a:effectRef idx="2">
+            <a:schemeClr val="dk1"/>
+          </a:effectRef>
+          <a:fontRef idx="minor">
+            <a:schemeClr val="tx1"/>
+          </a:fontRef>
+        </p:style>
+      </p:cxnSp>
+      <p:cxnSp>
+        <p:nvCxnSpPr>
+          <p:cNvPr id="26" name="Connettore diritto 25">
+            <a:extLst>
+              <a:ext uri="{FF2B5EF4-FFF2-40B4-BE49-F238E27FC236}">
+                <a16:creationId xmlns:a16="http://schemas.microsoft.com/office/drawing/2014/main" id="{E37A84F6-B55A-4468-B75F-679898CB2FC0}"/>
+              </a:ext>
+            </a:extLst>
+          </p:cNvPr>
+          <p:cNvCxnSpPr>
+            <a:cxnSpLocks/>
+          </p:cNvCxnSpPr>
+          <p:nvPr/>
+        </p:nvCxnSpPr>
+        <p:spPr>
+          <a:xfrm flipV="1">
+            <a:off x="3379048" y="3348158"/>
+            <a:ext cx="1652431" cy="1344655"/>
+          </a:xfrm>
+          <a:prstGeom prst="line">
+            <a:avLst/>
+          </a:prstGeom>
+          <a:ln>
+            <a:headEnd type="none" w="med" len="med"/>
+            <a:tailEnd type="none" w="med" len="med"/>
+          </a:ln>
+        </p:spPr>
+        <p:style>
+          <a:lnRef idx="3">
+            <a:schemeClr val="dk1"/>
+          </a:lnRef>
+          <a:fillRef idx="0">
+            <a:schemeClr val="dk1"/>
+          </a:fillRef>
+          <a:effectRef idx="2">
+            <a:schemeClr val="dk1"/>
+          </a:effectRef>
+          <a:fontRef idx="minor">
+            <a:schemeClr val="tx1"/>
+          </a:fontRef>
+        </p:style>
+      </p:cxnSp>
+      <p:cxnSp>
+        <p:nvCxnSpPr>
+          <p:cNvPr id="25" name="Connettore diritto 24">
+            <a:extLst>
+              <a:ext uri="{FF2B5EF4-FFF2-40B4-BE49-F238E27FC236}">
+                <a16:creationId xmlns:a16="http://schemas.microsoft.com/office/drawing/2014/main" id="{77F49E93-79D8-476D-B5F7-01377E381AA1}"/>
+              </a:ext>
+            </a:extLst>
+          </p:cNvPr>
+          <p:cNvCxnSpPr>
+            <a:cxnSpLocks/>
+          </p:cNvCxnSpPr>
+          <p:nvPr/>
+        </p:nvCxnSpPr>
+        <p:spPr>
+          <a:xfrm>
+            <a:off x="7069116" y="3320572"/>
+            <a:ext cx="1700170" cy="1381886"/>
+          </a:xfrm>
+          <a:prstGeom prst="line">
+            <a:avLst/>
+          </a:prstGeom>
+          <a:ln/>
+        </p:spPr>
+        <p:style>
+          <a:lnRef idx="3">
+            <a:schemeClr val="dk1"/>
+          </a:lnRef>
+          <a:fillRef idx="0">
+            <a:schemeClr val="dk1"/>
+          </a:fillRef>
+          <a:effectRef idx="2">
+            <a:schemeClr val="dk1"/>
+          </a:effectRef>
+          <a:fontRef idx="minor">
+            <a:schemeClr val="tx1"/>
+          </a:fontRef>
+        </p:style>
+      </p:cxnSp>
+      <p:cxnSp>
+        <p:nvCxnSpPr>
+          <p:cNvPr id="23" name="Connettore diritto 22">
+            <a:extLst>
+              <a:ext uri="{FF2B5EF4-FFF2-40B4-BE49-F238E27FC236}">
+                <a16:creationId xmlns:a16="http://schemas.microsoft.com/office/drawing/2014/main" id="{FDA6CBB9-9AF0-4020-9652-FBEA53DB49A8}"/>
+              </a:ext>
+            </a:extLst>
+          </p:cNvPr>
+          <p:cNvCxnSpPr>
+            <a:cxnSpLocks/>
+          </p:cNvCxnSpPr>
+          <p:nvPr/>
+        </p:nvCxnSpPr>
+        <p:spPr>
+          <a:xfrm flipH="1">
+            <a:off x="7066155" y="1938687"/>
+            <a:ext cx="1703134" cy="1381885"/>
+          </a:xfrm>
+          <a:prstGeom prst="line">
+            <a:avLst/>
+          </a:prstGeom>
+          <a:ln/>
+        </p:spPr>
+        <p:style>
+          <a:lnRef idx="3">
+            <a:schemeClr val="dk1"/>
+          </a:lnRef>
+          <a:fillRef idx="0">
+            <a:schemeClr val="dk1"/>
+          </a:fillRef>
+          <a:effectRef idx="2">
+            <a:schemeClr val="dk1"/>
+          </a:effectRef>
+          <a:fontRef idx="minor">
+            <a:schemeClr val="tx1"/>
+          </a:fontRef>
+        </p:style>
+      </p:cxnSp>
+      <p:sp>
+        <p:nvSpPr>
+          <p:cNvPr id="9" name="Ovale 8">
+            <a:extLst>
+              <a:ext uri="{FF2B5EF4-FFF2-40B4-BE49-F238E27FC236}">
+                <a16:creationId xmlns:a16="http://schemas.microsoft.com/office/drawing/2014/main" id="{E1CD858E-A9AC-498F-B0ED-9337B0DBAC7D}"/>
+              </a:ext>
+            </a:extLst>
+          </p:cNvPr>
+          <p:cNvSpPr/>
+          <p:nvPr/>
+        </p:nvSpPr>
+        <p:spPr>
+          <a:xfrm>
+            <a:off x="6796477" y="3064708"/>
+            <a:ext cx="545285" cy="511729"/>
+          </a:xfrm>
+          <a:prstGeom prst="ellipse">
+            <a:avLst/>
+          </a:prstGeom>
+          <a:solidFill>
+            <a:schemeClr val="bg2">
+              <a:lumMod val="50000"/>
+            </a:schemeClr>
+          </a:solidFill>
+          <a:ln>
+            <a:solidFill>
+              <a:schemeClr val="tx1">
+                <a:lumMod val="85000"/>
+                <a:lumOff val="15000"/>
+              </a:schemeClr>
+            </a:solidFill>
+          </a:ln>
+        </p:spPr>
+        <p:style>
+          <a:lnRef idx="2">
+            <a:schemeClr val="accent1">
+              <a:shade val="50000"/>
+            </a:schemeClr>
+          </a:lnRef>
+          <a:fillRef idx="1">
+            <a:schemeClr val="accent1"/>
+          </a:fillRef>
+          <a:effectRef idx="0">
+            <a:schemeClr val="accent1"/>
+          </a:effectRef>
+          <a:fontRef idx="minor">
+            <a:schemeClr val="lt1"/>
+          </a:fontRef>
+        </p:style>
+        <p:txBody>
+          <a:bodyPr rtlCol="0" anchor="ctr"/>
+          <a:lstStyle/>
+          <a:p>
+            <a:pPr algn="ctr"/>
+            <a:r>
+              <a:rPr lang="it-IT" sz="2400" i="1" dirty="0"/>
+              <a:t>k</a:t>
+            </a:r>
+          </a:p>
+        </p:txBody>
+      </p:sp>
+      <p:sp>
+        <p:nvSpPr>
+          <p:cNvPr id="10" name="Ovale 9">
+            <a:extLst>
+              <a:ext uri="{FF2B5EF4-FFF2-40B4-BE49-F238E27FC236}">
+                <a16:creationId xmlns:a16="http://schemas.microsoft.com/office/drawing/2014/main" id="{87F835B7-821B-4C37-9ABF-E05F9D123497}"/>
+              </a:ext>
+            </a:extLst>
+          </p:cNvPr>
+          <p:cNvSpPr/>
+          <p:nvPr/>
+        </p:nvSpPr>
+        <p:spPr>
+          <a:xfrm>
+            <a:off x="8496647" y="4407584"/>
+            <a:ext cx="545285" cy="511729"/>
+          </a:xfrm>
+          <a:prstGeom prst="ellipse">
+            <a:avLst/>
+          </a:prstGeom>
+          <a:solidFill>
+            <a:schemeClr val="bg2">
+              <a:lumMod val="50000"/>
+            </a:schemeClr>
+          </a:solidFill>
+          <a:ln>
+            <a:solidFill>
+              <a:schemeClr val="tx1">
+                <a:lumMod val="85000"/>
+                <a:lumOff val="15000"/>
+              </a:schemeClr>
+            </a:solidFill>
+          </a:ln>
+        </p:spPr>
+        <p:style>
+          <a:lnRef idx="2">
+            <a:schemeClr val="accent1">
+              <a:shade val="50000"/>
+            </a:schemeClr>
+          </a:lnRef>
+          <a:fillRef idx="1">
+            <a:schemeClr val="accent1"/>
+          </a:fillRef>
+          <a:effectRef idx="0">
+            <a:schemeClr val="accent1"/>
+          </a:effectRef>
+          <a:fontRef idx="minor">
+            <a:schemeClr val="lt1"/>
+          </a:fontRef>
+        </p:style>
+        <p:txBody>
+          <a:bodyPr rtlCol="0" anchor="ctr"/>
+          <a:lstStyle/>
+          <a:p>
+            <a:pPr algn="ctr"/>
+            <a:r>
+              <a:rPr lang="it-IT" sz="2400" dirty="0"/>
+              <a:t>s</a:t>
+            </a:r>
+          </a:p>
+        </p:txBody>
+      </p:sp>
+      <p:sp>
+        <p:nvSpPr>
+          <p:cNvPr id="11" name="Ovale 10">
+            <a:extLst>
+              <a:ext uri="{FF2B5EF4-FFF2-40B4-BE49-F238E27FC236}">
+                <a16:creationId xmlns:a16="http://schemas.microsoft.com/office/drawing/2014/main" id="{D5EFBF8E-3097-4D14-871D-D0818153B3B1}"/>
+              </a:ext>
+            </a:extLst>
+          </p:cNvPr>
+          <p:cNvSpPr/>
+          <p:nvPr/>
+        </p:nvSpPr>
+        <p:spPr>
+          <a:xfrm>
+            <a:off x="8496647" y="1682823"/>
+            <a:ext cx="545285" cy="511729"/>
+          </a:xfrm>
+          <a:prstGeom prst="ellipse">
+            <a:avLst/>
+          </a:prstGeom>
+          <a:solidFill>
+            <a:schemeClr val="bg2">
+              <a:lumMod val="50000"/>
+            </a:schemeClr>
+          </a:solidFill>
+          <a:ln>
+            <a:solidFill>
+              <a:schemeClr val="tx1">
+                <a:lumMod val="85000"/>
+                <a:lumOff val="15000"/>
+              </a:schemeClr>
+            </a:solidFill>
+          </a:ln>
+        </p:spPr>
+        <p:style>
+          <a:lnRef idx="2">
+            <a:schemeClr val="accent1">
+              <a:shade val="50000"/>
+            </a:schemeClr>
+          </a:lnRef>
+          <a:fillRef idx="1">
+            <a:schemeClr val="accent1"/>
+          </a:fillRef>
+          <a:effectRef idx="0">
+            <a:schemeClr val="accent1"/>
+          </a:effectRef>
+          <a:fontRef idx="minor">
+            <a:schemeClr val="lt1"/>
+          </a:fontRef>
+        </p:style>
+        <p:txBody>
+          <a:bodyPr rtlCol="0" anchor="ctr"/>
+          <a:lstStyle/>
+          <a:p>
+            <a:pPr algn="ctr"/>
+            <a:r>
+              <a:rPr lang="it-IT" sz="2400" dirty="0"/>
+              <a:t>u</a:t>
+            </a:r>
+          </a:p>
+        </p:txBody>
+      </p:sp>
+      <mc:AlternateContent xmlns:mc="http://schemas.openxmlformats.org/markup-compatibility/2006">
+        <mc:Choice xmlns:a14="http://schemas.microsoft.com/office/drawing/2010/main" Requires="a14">
+          <p:sp>
+            <p:nvSpPr>
+              <p:cNvPr id="34" name="CasellaDiTesto 33">
+                <a:extLst>
+                  <a:ext uri="{FF2B5EF4-FFF2-40B4-BE49-F238E27FC236}">
+                    <a16:creationId xmlns:a16="http://schemas.microsoft.com/office/drawing/2014/main" id="{3043EDF5-0856-4F39-8192-5232679663C3}"/>
+                  </a:ext>
+                </a:extLst>
+              </p:cNvPr>
+              <p:cNvSpPr txBox="1"/>
+              <p:nvPr/>
+            </p:nvSpPr>
+            <p:spPr>
+              <a:xfrm rot="19256206">
+                <a:off x="7382285" y="2207932"/>
+                <a:ext cx="1008724" cy="369332"/>
+              </a:xfrm>
+              <a:prstGeom prst="rect">
+                <a:avLst/>
+              </a:prstGeom>
+              <a:noFill/>
+            </p:spPr>
+            <p:txBody>
+              <a:bodyPr wrap="square" rtlCol="0">
+                <a:spAutoFit/>
+              </a:bodyPr>
+              <a:lstStyle/>
+              <a:p>
+                <a:pPr/>
+                <a14:m>
+                  <m:oMathPara xmlns:m="http://schemas.openxmlformats.org/officeDocument/2006/math">
+                    <m:oMathParaPr>
+                      <m:jc m:val="centerGroup"/>
+                    </m:oMathParaPr>
+                    <m:oMath xmlns:m="http://schemas.openxmlformats.org/officeDocument/2006/math">
+                      <m:r>
+                        <a:rPr lang="it-IT" i="1" smtClean="0">
+                          <a:latin typeface="Cambria Math" panose="02040503050406030204" pitchFamily="18" charset="0"/>
+                        </a:rPr>
+                        <m:t>6</m:t>
+                      </m:r>
+                    </m:oMath>
+                  </m:oMathPara>
+                </a14:m>
+                <a:endParaRPr lang="it-IT" dirty="0"/>
+              </a:p>
+            </p:txBody>
+          </p:sp>
+        </mc:Choice>
+        <mc:Fallback>
+          <p:sp>
+            <p:nvSpPr>
+              <p:cNvPr id="34" name="CasellaDiTesto 33">
+                <a:extLst>
+                  <a:ext uri="{FF2B5EF4-FFF2-40B4-BE49-F238E27FC236}">
+                    <a16:creationId xmlns:a16="http://schemas.microsoft.com/office/drawing/2014/main" id="{3043EDF5-0856-4F39-8192-5232679663C3}"/>
+                  </a:ext>
+                </a:extLst>
+              </p:cNvPr>
+              <p:cNvSpPr txBox="1">
+                <a:spLocks noRot="1" noChangeAspect="1" noMove="1" noResize="1" noEditPoints="1" noAdjustHandles="1" noChangeArrowheads="1" noChangeShapeType="1" noTextEdit="1"/>
+              </p:cNvSpPr>
+              <p:nvPr/>
+            </p:nvSpPr>
+            <p:spPr>
+              <a:xfrm rot="19256206">
+                <a:off x="7382285" y="2207932"/>
+                <a:ext cx="1008724" cy="369332"/>
+              </a:xfrm>
+              <a:prstGeom prst="rect">
+                <a:avLst/>
+              </a:prstGeom>
+              <a:blipFill>
+                <a:blip r:embed="rId2"/>
+                <a:stretch>
+                  <a:fillRect/>
+                </a:stretch>
+              </a:blipFill>
+            </p:spPr>
+            <p:txBody>
+              <a:bodyPr/>
+              <a:lstStyle/>
+              <a:p>
+                <a:r>
+                  <a:rPr lang="it-IT">
+                    <a:noFill/>
+                  </a:rPr>
+                  <a:t> </a:t>
+                </a:r>
+              </a:p>
+            </p:txBody>
+          </p:sp>
+        </mc:Fallback>
+      </mc:AlternateContent>
+      <p:sp>
+        <p:nvSpPr>
+          <p:cNvPr id="21" name="Ovale 20">
+            <a:extLst>
+              <a:ext uri="{FF2B5EF4-FFF2-40B4-BE49-F238E27FC236}">
+                <a16:creationId xmlns:a16="http://schemas.microsoft.com/office/drawing/2014/main" id="{DBFB74D1-6E3E-4A26-8043-72ACF18E20E5}"/>
+              </a:ext>
+            </a:extLst>
+          </p:cNvPr>
+          <p:cNvSpPr/>
+          <p:nvPr/>
+        </p:nvSpPr>
+        <p:spPr>
+          <a:xfrm>
+            <a:off x="3061509" y="1680288"/>
+            <a:ext cx="545285" cy="511729"/>
+          </a:xfrm>
+          <a:prstGeom prst="ellipse">
+            <a:avLst/>
+          </a:prstGeom>
+          <a:solidFill>
+            <a:schemeClr val="bg2">
+              <a:lumMod val="50000"/>
+            </a:schemeClr>
+          </a:solidFill>
+          <a:ln>
+            <a:solidFill>
+              <a:schemeClr val="tx1">
+                <a:lumMod val="85000"/>
+                <a:lumOff val="15000"/>
+              </a:schemeClr>
+            </a:solidFill>
+          </a:ln>
+        </p:spPr>
+        <p:style>
+          <a:lnRef idx="2">
+            <a:schemeClr val="accent1">
+              <a:shade val="50000"/>
+            </a:schemeClr>
+          </a:lnRef>
+          <a:fillRef idx="1">
+            <a:schemeClr val="accent1"/>
+          </a:fillRef>
+          <a:effectRef idx="0">
+            <a:schemeClr val="accent1"/>
+          </a:effectRef>
+          <a:fontRef idx="minor">
+            <a:schemeClr val="lt1"/>
+          </a:fontRef>
+        </p:style>
+        <p:txBody>
+          <a:bodyPr rtlCol="0" anchor="ctr"/>
+          <a:lstStyle/>
+          <a:p>
+            <a:pPr algn="ctr"/>
+            <a:r>
+              <a:rPr lang="it-IT" sz="2400" dirty="0"/>
+              <a:t>f</a:t>
+            </a:r>
+          </a:p>
+        </p:txBody>
+      </p:sp>
+      <p:sp>
+        <p:nvSpPr>
+          <p:cNvPr id="22" name="Ovale 21">
+            <a:extLst>
+              <a:ext uri="{FF2B5EF4-FFF2-40B4-BE49-F238E27FC236}">
+                <a16:creationId xmlns:a16="http://schemas.microsoft.com/office/drawing/2014/main" id="{FC5B5791-4100-46D0-8B8B-DCCDC0EC40EC}"/>
+              </a:ext>
+            </a:extLst>
+          </p:cNvPr>
+          <p:cNvSpPr/>
+          <p:nvPr/>
+        </p:nvSpPr>
+        <p:spPr>
+          <a:xfrm>
+            <a:off x="3061510" y="4420998"/>
+            <a:ext cx="545285" cy="511729"/>
+          </a:xfrm>
+          <a:prstGeom prst="ellipse">
+            <a:avLst/>
+          </a:prstGeom>
+          <a:solidFill>
+            <a:schemeClr val="bg2">
+              <a:lumMod val="50000"/>
+            </a:schemeClr>
+          </a:solidFill>
+          <a:ln>
+            <a:solidFill>
+              <a:schemeClr val="tx1">
+                <a:lumMod val="85000"/>
+                <a:lumOff val="15000"/>
+              </a:schemeClr>
+            </a:solidFill>
+          </a:ln>
+        </p:spPr>
+        <p:style>
+          <a:lnRef idx="2">
+            <a:schemeClr val="accent1">
+              <a:shade val="50000"/>
+            </a:schemeClr>
+          </a:lnRef>
+          <a:fillRef idx="1">
+            <a:schemeClr val="accent1"/>
+          </a:fillRef>
+          <a:effectRef idx="0">
+            <a:schemeClr val="accent1"/>
+          </a:effectRef>
+          <a:fontRef idx="minor">
+            <a:schemeClr val="lt1"/>
+          </a:fontRef>
+        </p:style>
+        <p:txBody>
+          <a:bodyPr rtlCol="0" anchor="ctr"/>
+          <a:lstStyle/>
+          <a:p>
+            <a:pPr algn="ctr"/>
+            <a:r>
+              <a:rPr lang="it-IT" sz="2400" dirty="0"/>
+              <a:t>b</a:t>
+            </a:r>
+          </a:p>
+        </p:txBody>
+      </p:sp>
+      <mc:AlternateContent xmlns:mc="http://schemas.openxmlformats.org/markup-compatibility/2006">
+        <mc:Choice xmlns:a14="http://schemas.microsoft.com/office/drawing/2010/main" Requires="a14">
+          <p:sp>
+            <p:nvSpPr>
+              <p:cNvPr id="20" name="CasellaDiTesto 19">
+                <a:extLst>
+                  <a:ext uri="{FF2B5EF4-FFF2-40B4-BE49-F238E27FC236}">
+                    <a16:creationId xmlns:a16="http://schemas.microsoft.com/office/drawing/2014/main" id="{AEC37D64-B461-4739-B615-49B84BD77AC6}"/>
+                  </a:ext>
+                </a:extLst>
+              </p:cNvPr>
+              <p:cNvSpPr txBox="1"/>
+              <p:nvPr/>
+            </p:nvSpPr>
+            <p:spPr>
+              <a:xfrm rot="2308727">
+                <a:off x="7254652" y="3930045"/>
+                <a:ext cx="1008724" cy="369332"/>
+              </a:xfrm>
+              <a:prstGeom prst="rect">
+                <a:avLst/>
+              </a:prstGeom>
+              <a:noFill/>
+            </p:spPr>
+            <p:txBody>
+              <a:bodyPr wrap="square" rtlCol="0">
+                <a:spAutoFit/>
+              </a:bodyPr>
+              <a:lstStyle/>
+              <a:p>
+                <a:pPr/>
+                <a14:m>
+                  <m:oMathPara xmlns:m="http://schemas.openxmlformats.org/officeDocument/2006/math">
+                    <m:oMathParaPr>
+                      <m:jc m:val="centerGroup"/>
+                    </m:oMathParaPr>
+                    <m:oMath xmlns:m="http://schemas.openxmlformats.org/officeDocument/2006/math">
+                      <m:r>
+                        <a:rPr lang="it-IT" i="1" smtClean="0">
+                          <a:latin typeface="Cambria Math" panose="02040503050406030204" pitchFamily="18" charset="0"/>
+                        </a:rPr>
+                        <m:t>7</m:t>
+                      </m:r>
+                    </m:oMath>
+                  </m:oMathPara>
+                </a14:m>
+                <a:endParaRPr lang="it-IT" dirty="0"/>
+              </a:p>
+            </p:txBody>
+          </p:sp>
+        </mc:Choice>
+        <mc:Fallback>
+          <p:sp>
+            <p:nvSpPr>
+              <p:cNvPr id="20" name="CasellaDiTesto 19">
+                <a:extLst>
+                  <a:ext uri="{FF2B5EF4-FFF2-40B4-BE49-F238E27FC236}">
+                    <a16:creationId xmlns:a16="http://schemas.microsoft.com/office/drawing/2014/main" id="{AEC37D64-B461-4739-B615-49B84BD77AC6}"/>
+                  </a:ext>
+                </a:extLst>
+              </p:cNvPr>
+              <p:cNvSpPr txBox="1">
+                <a:spLocks noRot="1" noChangeAspect="1" noMove="1" noResize="1" noEditPoints="1" noAdjustHandles="1" noChangeArrowheads="1" noChangeShapeType="1" noTextEdit="1"/>
+              </p:cNvSpPr>
+              <p:nvPr/>
+            </p:nvSpPr>
+            <p:spPr>
+              <a:xfrm rot="2308727">
+                <a:off x="7254652" y="3930045"/>
+                <a:ext cx="1008724" cy="369332"/>
+              </a:xfrm>
+              <a:prstGeom prst="rect">
+                <a:avLst/>
+              </a:prstGeom>
+              <a:blipFill>
+                <a:blip r:embed="rId3"/>
+                <a:stretch>
+                  <a:fillRect/>
+                </a:stretch>
+              </a:blipFill>
+            </p:spPr>
+            <p:txBody>
+              <a:bodyPr/>
+              <a:lstStyle/>
+              <a:p>
+                <a:r>
+                  <a:rPr lang="it-IT">
+                    <a:noFill/>
+                  </a:rPr>
+                  <a:t> </a:t>
+                </a:r>
+              </a:p>
+            </p:txBody>
+          </p:sp>
+        </mc:Fallback>
+      </mc:AlternateContent>
+      <mc:AlternateContent xmlns:mc="http://schemas.openxmlformats.org/markup-compatibility/2006">
+        <mc:Choice xmlns:a14="http://schemas.microsoft.com/office/drawing/2010/main" Requires="a14">
+          <p:sp>
+            <p:nvSpPr>
+              <p:cNvPr id="29" name="CasellaDiTesto 28">
+                <a:extLst>
+                  <a:ext uri="{FF2B5EF4-FFF2-40B4-BE49-F238E27FC236}">
+                    <a16:creationId xmlns:a16="http://schemas.microsoft.com/office/drawing/2014/main" id="{26FB9E63-3C7F-4DFC-89B8-1BCB92421E64}"/>
+                  </a:ext>
+                </a:extLst>
+              </p:cNvPr>
+              <p:cNvSpPr txBox="1"/>
+              <p:nvPr/>
+            </p:nvSpPr>
+            <p:spPr>
+              <a:xfrm rot="19256206">
+                <a:off x="3949240" y="3940373"/>
+                <a:ext cx="1008724" cy="369332"/>
+              </a:xfrm>
+              <a:prstGeom prst="rect">
+                <a:avLst/>
+              </a:prstGeom>
+              <a:noFill/>
+            </p:spPr>
+            <p:txBody>
+              <a:bodyPr wrap="square" rtlCol="0">
+                <a:spAutoFit/>
+              </a:bodyPr>
+              <a:lstStyle/>
+              <a:p>
+                <a:pPr/>
+                <a14:m>
+                  <m:oMathPara xmlns:m="http://schemas.openxmlformats.org/officeDocument/2006/math">
+                    <m:oMathParaPr>
+                      <m:jc m:val="centerGroup"/>
+                    </m:oMathParaPr>
+                    <m:oMath xmlns:m="http://schemas.openxmlformats.org/officeDocument/2006/math">
+                      <m:r>
+                        <a:rPr lang="it-IT" i="1" smtClean="0">
+                          <a:latin typeface="Cambria Math" panose="02040503050406030204" pitchFamily="18" charset="0"/>
+                        </a:rPr>
+                        <m:t>2</m:t>
+                      </m:r>
+                    </m:oMath>
+                  </m:oMathPara>
+                </a14:m>
+                <a:endParaRPr lang="it-IT" dirty="0"/>
+              </a:p>
+            </p:txBody>
+          </p:sp>
+        </mc:Choice>
+        <mc:Fallback>
+          <p:sp>
+            <p:nvSpPr>
+              <p:cNvPr id="29" name="CasellaDiTesto 28">
+                <a:extLst>
+                  <a:ext uri="{FF2B5EF4-FFF2-40B4-BE49-F238E27FC236}">
+                    <a16:creationId xmlns:a16="http://schemas.microsoft.com/office/drawing/2014/main" id="{26FB9E63-3C7F-4DFC-89B8-1BCB92421E64}"/>
+                  </a:ext>
+                </a:extLst>
+              </p:cNvPr>
+              <p:cNvSpPr txBox="1">
+                <a:spLocks noRot="1" noChangeAspect="1" noMove="1" noResize="1" noEditPoints="1" noAdjustHandles="1" noChangeArrowheads="1" noChangeShapeType="1" noTextEdit="1"/>
+              </p:cNvSpPr>
+              <p:nvPr/>
+            </p:nvSpPr>
+            <p:spPr>
+              <a:xfrm rot="19256206">
+                <a:off x="3949240" y="3940373"/>
+                <a:ext cx="1008724" cy="369332"/>
+              </a:xfrm>
+              <a:prstGeom prst="rect">
+                <a:avLst/>
+              </a:prstGeom>
+              <a:blipFill>
+                <a:blip r:embed="rId4"/>
+                <a:stretch>
+                  <a:fillRect/>
+                </a:stretch>
+              </a:blipFill>
+            </p:spPr>
+            <p:txBody>
+              <a:bodyPr/>
+              <a:lstStyle/>
+              <a:p>
+                <a:r>
+                  <a:rPr lang="it-IT">
+                    <a:noFill/>
+                  </a:rPr>
+                  <a:t> </a:t>
+                </a:r>
+              </a:p>
+            </p:txBody>
+          </p:sp>
+        </mc:Fallback>
+      </mc:AlternateContent>
+      <mc:AlternateContent xmlns:mc="http://schemas.openxmlformats.org/markup-compatibility/2006">
+        <mc:Choice xmlns:a14="http://schemas.microsoft.com/office/drawing/2010/main" Requires="a14">
+          <p:sp>
+            <p:nvSpPr>
+              <p:cNvPr id="30" name="CasellaDiTesto 29">
+                <a:extLst>
+                  <a:ext uri="{FF2B5EF4-FFF2-40B4-BE49-F238E27FC236}">
+                    <a16:creationId xmlns:a16="http://schemas.microsoft.com/office/drawing/2014/main" id="{06F43F6E-0131-4A91-B0C7-9E49F1C1C82A}"/>
+                  </a:ext>
+                </a:extLst>
+              </p:cNvPr>
+              <p:cNvSpPr txBox="1"/>
+              <p:nvPr/>
+            </p:nvSpPr>
+            <p:spPr>
+              <a:xfrm rot="2308727">
+                <a:off x="3782847" y="2224434"/>
+                <a:ext cx="1008724" cy="369332"/>
+              </a:xfrm>
+              <a:prstGeom prst="rect">
+                <a:avLst/>
+              </a:prstGeom>
+              <a:noFill/>
+            </p:spPr>
+            <p:txBody>
+              <a:bodyPr wrap="square" rtlCol="0">
+                <a:spAutoFit/>
+              </a:bodyPr>
+              <a:lstStyle/>
+              <a:p>
+                <a:pPr/>
+                <a14:m>
+                  <m:oMathPara xmlns:m="http://schemas.openxmlformats.org/officeDocument/2006/math">
+                    <m:oMathParaPr>
+                      <m:jc m:val="centerGroup"/>
+                    </m:oMathParaPr>
+                    <m:oMath xmlns:m="http://schemas.openxmlformats.org/officeDocument/2006/math">
+                      <m:r>
+                        <a:rPr lang="it-IT" i="1" smtClean="0">
+                          <a:latin typeface="Cambria Math" panose="02040503050406030204" pitchFamily="18" charset="0"/>
+                        </a:rPr>
+                        <m:t>1</m:t>
+                      </m:r>
+                      <m:r>
+                        <a:rPr lang="it-IT" b="0" i="1" smtClean="0">
+                          <a:latin typeface="Cambria Math" panose="02040503050406030204" pitchFamily="18" charset="0"/>
+                        </a:rPr>
+                        <m:t>1</m:t>
+                      </m:r>
+                    </m:oMath>
+                  </m:oMathPara>
+                </a14:m>
+                <a:endParaRPr lang="it-IT" dirty="0"/>
+              </a:p>
+            </p:txBody>
+          </p:sp>
+        </mc:Choice>
+        <mc:Fallback>
+          <p:sp>
+            <p:nvSpPr>
+              <p:cNvPr id="30" name="CasellaDiTesto 29">
+                <a:extLst>
+                  <a:ext uri="{FF2B5EF4-FFF2-40B4-BE49-F238E27FC236}">
+                    <a16:creationId xmlns:a16="http://schemas.microsoft.com/office/drawing/2014/main" id="{06F43F6E-0131-4A91-B0C7-9E49F1C1C82A}"/>
+                  </a:ext>
+                </a:extLst>
+              </p:cNvPr>
+              <p:cNvSpPr txBox="1">
+                <a:spLocks noRot="1" noChangeAspect="1" noMove="1" noResize="1" noEditPoints="1" noAdjustHandles="1" noChangeArrowheads="1" noChangeShapeType="1" noTextEdit="1"/>
+              </p:cNvSpPr>
+              <p:nvPr/>
+            </p:nvSpPr>
+            <p:spPr>
+              <a:xfrm rot="2308727">
+                <a:off x="3782847" y="2224434"/>
+                <a:ext cx="1008724" cy="369332"/>
+              </a:xfrm>
+              <a:prstGeom prst="rect">
+                <a:avLst/>
+              </a:prstGeom>
+              <a:blipFill>
+                <a:blip r:embed="rId5"/>
+                <a:stretch>
+                  <a:fillRect/>
+                </a:stretch>
+              </a:blipFill>
+            </p:spPr>
+            <p:txBody>
+              <a:bodyPr/>
+              <a:lstStyle/>
+              <a:p>
+                <a:r>
+                  <a:rPr lang="it-IT">
+                    <a:noFill/>
+                  </a:rPr>
+                  <a:t> </a:t>
+                </a:r>
+              </a:p>
+            </p:txBody>
+          </p:sp>
+        </mc:Fallback>
+      </mc:AlternateContent>
+      <p:sp>
+        <p:nvSpPr>
+          <p:cNvPr id="15" name="Ovale 14">
+            <a:extLst>
+              <a:ext uri="{FF2B5EF4-FFF2-40B4-BE49-F238E27FC236}">
+                <a16:creationId xmlns:a16="http://schemas.microsoft.com/office/drawing/2014/main" id="{8D5BD6A8-4A8D-4BFF-8C89-28AAD2DD2E07}"/>
+              </a:ext>
+            </a:extLst>
+          </p:cNvPr>
+          <p:cNvSpPr/>
+          <p:nvPr/>
+        </p:nvSpPr>
+        <p:spPr>
+          <a:xfrm>
+            <a:off x="4688944" y="3064708"/>
+            <a:ext cx="545285" cy="511729"/>
+          </a:xfrm>
+          <a:prstGeom prst="ellipse">
+            <a:avLst/>
+          </a:prstGeom>
+          <a:solidFill>
+            <a:schemeClr val="bg2">
+              <a:lumMod val="50000"/>
+            </a:schemeClr>
+          </a:solidFill>
+          <a:ln>
+            <a:solidFill>
+              <a:schemeClr val="tx1">
+                <a:lumMod val="85000"/>
+                <a:lumOff val="15000"/>
+              </a:schemeClr>
+            </a:solidFill>
+          </a:ln>
+        </p:spPr>
+        <p:style>
+          <a:lnRef idx="2">
+            <a:schemeClr val="accent1">
+              <a:shade val="50000"/>
+            </a:schemeClr>
+          </a:lnRef>
+          <a:fillRef idx="1">
+            <a:schemeClr val="accent1"/>
+          </a:fillRef>
+          <a:effectRef idx="0">
+            <a:schemeClr val="accent1"/>
+          </a:effectRef>
+          <a:fontRef idx="minor">
+            <a:schemeClr val="lt1"/>
+          </a:fontRef>
+        </p:style>
+        <p:txBody>
+          <a:bodyPr rtlCol="0" anchor="ctr"/>
+          <a:lstStyle/>
+          <a:p>
+            <a:pPr algn="ctr"/>
+            <a:r>
+              <a:rPr lang="it-IT" sz="2400" i="1" dirty="0"/>
+              <a:t>p</a:t>
+            </a:r>
+          </a:p>
+        </p:txBody>
+      </p:sp>
+      <mc:AlternateContent xmlns:mc="http://schemas.openxmlformats.org/markup-compatibility/2006">
+        <mc:Choice xmlns:a14="http://schemas.microsoft.com/office/drawing/2010/main" Requires="a14">
+          <p:sp>
+            <p:nvSpPr>
+              <p:cNvPr id="19" name="CasellaDiTesto 18">
+                <a:extLst>
+                  <a:ext uri="{FF2B5EF4-FFF2-40B4-BE49-F238E27FC236}">
+                    <a16:creationId xmlns:a16="http://schemas.microsoft.com/office/drawing/2014/main" id="{8EBC1935-0AEC-4487-AF17-F984F8DAA849}"/>
+                  </a:ext>
+                </a:extLst>
+              </p:cNvPr>
+              <p:cNvSpPr txBox="1"/>
+              <p:nvPr/>
+            </p:nvSpPr>
+            <p:spPr>
+              <a:xfrm>
+                <a:off x="5503907" y="2948705"/>
+                <a:ext cx="1008724" cy="369332"/>
+              </a:xfrm>
+              <a:prstGeom prst="rect">
+                <a:avLst/>
+              </a:prstGeom>
+              <a:noFill/>
+            </p:spPr>
+            <p:txBody>
+              <a:bodyPr wrap="square" rtlCol="0">
+                <a:spAutoFit/>
+              </a:bodyPr>
+              <a:lstStyle/>
+              <a:p>
+                <a:pPr/>
+                <a14:m>
+                  <m:oMathPara xmlns:m="http://schemas.openxmlformats.org/officeDocument/2006/math">
+                    <m:oMathParaPr>
+                      <m:jc m:val="centerGroup"/>
+                    </m:oMathParaPr>
+                    <m:oMath xmlns:m="http://schemas.openxmlformats.org/officeDocument/2006/math">
+                      <m:r>
+                        <a:rPr lang="it-IT" i="1" smtClean="0">
+                          <a:latin typeface="Cambria Math" panose="02040503050406030204" pitchFamily="18" charset="0"/>
+                        </a:rPr>
+                        <m:t>4</m:t>
+                      </m:r>
+                    </m:oMath>
+                  </m:oMathPara>
+                </a14:m>
+                <a:endParaRPr lang="it-IT" dirty="0"/>
+              </a:p>
+            </p:txBody>
+          </p:sp>
+        </mc:Choice>
+        <mc:Fallback>
+          <p:sp>
+            <p:nvSpPr>
+              <p:cNvPr id="19" name="CasellaDiTesto 18">
+                <a:extLst>
+                  <a:ext uri="{FF2B5EF4-FFF2-40B4-BE49-F238E27FC236}">
+                    <a16:creationId xmlns:a16="http://schemas.microsoft.com/office/drawing/2014/main" id="{8EBC1935-0AEC-4487-AF17-F984F8DAA849}"/>
+                  </a:ext>
+                </a:extLst>
+              </p:cNvPr>
+              <p:cNvSpPr txBox="1">
+                <a:spLocks noRot="1" noChangeAspect="1" noMove="1" noResize="1" noEditPoints="1" noAdjustHandles="1" noChangeArrowheads="1" noChangeShapeType="1" noTextEdit="1"/>
+              </p:cNvSpPr>
+              <p:nvPr/>
+            </p:nvSpPr>
+            <p:spPr>
+              <a:xfrm>
+                <a:off x="5503907" y="2948705"/>
+                <a:ext cx="1008724" cy="369332"/>
+              </a:xfrm>
+              <a:prstGeom prst="rect">
+                <a:avLst/>
+              </a:prstGeom>
+              <a:blipFill>
+                <a:blip r:embed="rId6"/>
+                <a:stretch>
+                  <a:fillRect/>
+                </a:stretch>
+              </a:blipFill>
+            </p:spPr>
+            <p:txBody>
+              <a:bodyPr/>
+              <a:lstStyle/>
+              <a:p>
+                <a:r>
+                  <a:rPr lang="it-IT">
+                    <a:noFill/>
+                  </a:rPr>
+                  <a:t> </a:t>
+                </a:r>
+              </a:p>
+            </p:txBody>
+          </p:sp>
+        </mc:Fallback>
+      </mc:AlternateContent>
+    </p:spTree>
+    <p:extLst>
+      <p:ext uri="{BB962C8B-B14F-4D97-AF65-F5344CB8AC3E}">
+        <p14:creationId xmlns:p14="http://schemas.microsoft.com/office/powerpoint/2010/main" val="2266122327"/>
       </p:ext>
     </p:extLst>
   </p:cSld>

</xml_diff>